<commit_message>
Updating the API.pptx file
</commit_message>
<xml_diff>
--- a/presentation/API.pptx
+++ b/presentation/API.pptx
@@ -3062,8 +3062,8 @@
       </p:par>
     </p:tnLst>
     <p:bldLst>
+      <p:bldP build="whole" bldLvl="1" animBg="1" rev="0" advAuto="0" spid="119" grpId="1"/>
       <p:bldP build="whole" bldLvl="1" animBg="1" rev="0" advAuto="0" spid="120" grpId="2"/>
-      <p:bldP build="whole" bldLvl="1" animBg="1" rev="0" advAuto="0" spid="119" grpId="1"/>
     </p:bldLst>
   </p:timing>
 </p:sld>
@@ -3443,8 +3443,8 @@
         </p:nvSpPr>
         <p:spPr>
           <a:xfrm>
-            <a:off x="2420036" y="3090123"/>
-            <a:ext cx="9301680" cy="5844033"/>
+            <a:off x="2420036" y="3083773"/>
+            <a:ext cx="9301680" cy="5856734"/>
           </a:xfrm>
           <a:prstGeom prst="rect">
             <a:avLst/>
@@ -3464,56 +3464,56 @@
           </a:bodyPr>
           <a:lstStyle/>
           <a:p>
-            <a:pPr algn="just">
-              <a:spcBef>
-                <a:spcPts val="4200"/>
-              </a:spcBef>
-              <a:defRPr b="0" sz="2900"/>
-            </a:pPr>
-            <a:r>
-              <a:rPr u="sng">
-                <a:hlinkClick r:id="rId2" invalidUrl="" action="" tgtFrame="" tooltip="" history="1" highlightClick="0" endSnd="0"/>
-              </a:rPr>
-              <a:t>http://servicorest.com.br/produtos</a:t>
-            </a:r>
-          </a:p>
-          <a:p>
-            <a:pPr algn="just">
+            <a:pPr algn="l">
               <a:spcBef>
                 <a:spcPts val="4200"/>
               </a:spcBef>
               <a:defRPr b="0" sz="3000"/>
             </a:pPr>
             <a:r>
-              <a:rPr u="sng">
-                <a:hlinkClick r:id="rId3" invalidUrl="" action="" tgtFrame="" tooltip="" history="1" highlightClick="0" endSnd="0"/>
+              <a:rPr>
+                <a:hlinkClick r:id="rId2" invalidUrl="" action="" tgtFrame="" tooltip="" history="1" highlightClick="0" endSnd="0"/>
               </a:rPr>
-              <a:t>http://servicorest.com.br/clientes</a:t>
+              <a:t>http://servicorest.com.br/produtos</a:t>
             </a:r>
           </a:p>
           <a:p>
-            <a:pPr algn="just">
+            <a:pPr algn="l">
               <a:spcBef>
                 <a:spcPts val="4200"/>
               </a:spcBef>
               <a:defRPr b="0" sz="3000"/>
             </a:pPr>
             <a:r>
-              <a:rPr u="sng">
-                <a:hlinkClick r:id="rId4" invalidUrl="" action="" tgtFrame="" tooltip="" history="1" highlightClick="0" endSnd="0"/>
+              <a:rPr>
+                <a:hlinkClick r:id="rId3" invalidUrl="" action="" tgtFrame="" tooltip="" history="1" highlightClick="0" endSnd="0"/>
               </a:rPr>
-              <a:t>https://blog.caelum.com.br/rest-principios-e-boas-praticas/</a:t>
+              <a:t>http://servicorest.com.br/clientes</a:t>
             </a:r>
           </a:p>
           <a:p>
-            <a:pPr algn="just">
+            <a:pPr algn="l">
               <a:spcBef>
                 <a:spcPts val="4200"/>
               </a:spcBef>
               <a:defRPr b="0" sz="3000"/>
             </a:pPr>
             <a:r>
-              <a:rPr u="sng">
+              <a:rPr>
+                <a:hlinkClick r:id="rId4" invalidUrl="" action="" tgtFrame="" tooltip="" history="1" highlightClick="0" endSnd="0"/>
+              </a:rPr>
+              <a:t>https://blog.caelum.com.br/rest-principios-e-boas-praticas/</a:t>
+            </a:r>
+          </a:p>
+          <a:p>
+            <a:pPr algn="l">
+              <a:spcBef>
+                <a:spcPts val="4200"/>
+              </a:spcBef>
+              <a:defRPr b="0" sz="3000"/>
+            </a:pPr>
+            <a:r>
+              <a:rPr>
                 <a:hlinkClick r:id="rId5" invalidUrl="" action="" tgtFrame="" tooltip="" history="1" highlightClick="0" endSnd="0"/>
               </a:rPr>
               <a:t>https://mlsdev.com/blog/81-a-beginner-s-tutorial-for-understanding-restful-api</a:t>
@@ -4305,8 +4305,8 @@
       </p:par>
     </p:tnLst>
     <p:bldLst>
+      <p:bldP build="p" bldLvl="5" animBg="1" rev="0" advAuto="0" spid="123" grpId="2"/>
       <p:bldP build="whole" bldLvl="1" animBg="1" rev="0" advAuto="0" spid="122" grpId="1"/>
-      <p:bldP build="p" bldLvl="5" animBg="1" rev="0" advAuto="0" spid="123" grpId="2"/>
     </p:bldLst>
   </p:timing>
 </p:sld>
@@ -4587,8 +4587,8 @@
     </p:tnLst>
     <p:bldLst>
       <p:bldP build="whole" bldLvl="1" animBg="1" rev="0" advAuto="0" spid="127" grpId="2"/>
+      <p:bldP build="whole" bldLvl="1" animBg="1" rev="0" advAuto="0" spid="125" grpId="3"/>
       <p:bldP build="whole" bldLvl="1" animBg="1" rev="0" advAuto="0" spid="126" grpId="1"/>
-      <p:bldP build="whole" bldLvl="1" animBg="1" rev="0" advAuto="0" spid="125" grpId="3"/>
     </p:bldLst>
   </p:timing>
 </p:sld>
@@ -4686,7 +4686,7 @@
               <a:defRPr b="0" sz="2900"/>
             </a:pPr>
             <a:r>
-              <a:rPr u="sng">
+              <a:rPr>
                 <a:hlinkClick r:id="rId2" invalidUrl="" action="" tgtFrame="" tooltip="" history="1" highlightClick="0" endSnd="0"/>
               </a:rPr>
               <a:t>http://servicorest.com.br/produtos</a:t>
@@ -4700,7 +4700,7 @@
               <a:defRPr b="0" sz="3000"/>
             </a:pPr>
             <a:r>
-              <a:rPr u="sng">
+              <a:rPr>
                 <a:hlinkClick r:id="rId3" invalidUrl="" action="" tgtFrame="" tooltip="" history="1" highlightClick="0" endSnd="0"/>
               </a:rPr>
               <a:t>http://servicorest.com.br/clientes</a:t>
@@ -5079,8 +5079,8 @@
       </p:par>
     </p:tnLst>
     <p:bldLst>
+      <p:bldP build="whole" bldLvl="1" animBg="1" rev="0" advAuto="0" spid="131" grpId="2"/>
       <p:bldP build="p" bldLvl="5" animBg="1" rev="0" advAuto="0" spid="130" grpId="3"/>
-      <p:bldP build="whole" bldLvl="1" animBg="1" rev="0" advAuto="0" spid="131" grpId="2"/>
       <p:bldP build="p" bldLvl="5" animBg="1" rev="0" advAuto="0" spid="129" grpId="1"/>
     </p:bldLst>
   </p:timing>
@@ -5873,9 +5873,9 @@
       </p:par>
     </p:tnLst>
     <p:bldLst>
+      <p:bldP build="whole" bldLvl="1" animBg="1" rev="0" advAuto="0" spid="138" grpId="3"/>
+      <p:bldP build="whole" bldLvl="1" animBg="1" rev="0" advAuto="0" spid="139" grpId="1"/>
       <p:bldP build="whole" bldLvl="1" animBg="1" rev="0" advAuto="0" spid="140" grpId="2"/>
-      <p:bldP build="whole" bldLvl="1" animBg="1" rev="0" advAuto="0" spid="139" grpId="1"/>
-      <p:bldP build="whole" bldLvl="1" animBg="1" rev="0" advAuto="0" spid="138" grpId="3"/>
     </p:bldLst>
   </p:timing>
 </p:sld>
@@ -6272,8 +6272,8 @@
       </p:par>
     </p:tnLst>
     <p:bldLst>
+      <p:bldP build="whole" bldLvl="1" animBg="1" rev="0" advAuto="0" spid="142" grpId="1"/>
       <p:bldP build="p" bldLvl="5" animBg="1" rev="0" advAuto="0" spid="143" grpId="2"/>
-      <p:bldP build="whole" bldLvl="1" animBg="1" rev="0" advAuto="0" spid="142" grpId="1"/>
     </p:bldLst>
   </p:timing>
 </p:sld>
@@ -6324,7 +6324,7 @@
               <a:t>Fonte: </a:t>
             </a:r>
             <a:r>
-              <a:rPr u="sng">
+              <a:rPr>
                 <a:hlinkClick r:id="rId2" invalidUrl="" action="" tgtFrame="" tooltip="" history="1" highlightClick="0" endSnd="0"/>
               </a:rPr>
               <a:t>https://mlsdev.com/blog/81-a-beginner-s-tutorial-for-understanding-restful-api</a:t>
@@ -6485,8 +6485,8 @@
       </p:par>
     </p:tnLst>
     <p:bldLst>
+      <p:bldP build="whole" bldLvl="1" animBg="1" rev="0" advAuto="0" spid="146" grpId="1"/>
       <p:bldP build="whole" bldLvl="1" animBg="1" rev="0" advAuto="0" spid="145" grpId="2"/>
-      <p:bldP build="whole" bldLvl="1" animBg="1" rev="0" advAuto="0" spid="146" grpId="1"/>
     </p:bldLst>
   </p:timing>
 </p:sld>

</xml_diff>